<commit_message>
cree la carpeta de fusión de las visualizaciones de las modelaciones con svm y rf
</commit_message>
<xml_diff>
--- a/presentacion_jornadas_investigacion/las diapositivas_marco_julio.pptx
+++ b/presentacion_jornadas_investigacion/las diapositivas_marco_julio.pptx
@@ -3,11 +3,12 @@
 <p:presentation xmlns:a="http://schemas.openxmlformats.org/drawingml/2006/main" xmlns:p="http://schemas.openxmlformats.org/presentationml/2006/main" xmlns:r="http://schemas.openxmlformats.org/officeDocument/2006/relationships" xmlns:p14="http://schemas.microsoft.com/office/powerpoint/2010/main" xmlns:p15="http://schemas.microsoft.com/office/powerpoint/2012/main" xmlns:mc="http://schemas.openxmlformats.org/markup-compatibility/2006">
   <p:sldMasterIdLst>
     <p:sldMasterId id="2147483648" r:id="rId2"/>
+    <p:sldMasterId id="2147483650" r:id="rId3"/>
   </p:sldMasterIdLst>
   <p:sldIdLst>
-    <p:sldId id="256" r:id="rId3"/>
-    <p:sldId id="257" r:id="rId4"/>
-    <p:sldId id="258" r:id="rId5"/>
+    <p:sldId id="256" r:id="rId4"/>
+    <p:sldId id="257" r:id="rId5"/>
+    <p:sldId id="258" r:id="rId6"/>
   </p:sldIdLst>
   <p:sldSz cx="10080625" cy="5670550"/>
   <p:notesSz cx="7559675" cy="10691813"/>
@@ -44,7 +45,7 @@
         <p:spPr>
           <a:xfrm>
             <a:off x="504000" y="226080"/>
-            <a:ext cx="9071640" cy="946440"/>
+            <a:ext cx="9071280" cy="946080"/>
           </a:xfrm>
           <a:prstGeom prst="rect">
             <a:avLst/>
@@ -84,7 +85,7 @@
         <p:spPr>
           <a:xfrm>
             <a:off x="504000" y="1326600"/>
-            <a:ext cx="9071640" cy="3288240"/>
+            <a:ext cx="9071280" cy="3287880"/>
           </a:xfrm>
           <a:prstGeom prst="rect">
             <a:avLst/>
@@ -121,7 +122,7 @@
             <a:spLocks noGrp="1"/>
           </p:cNvSpPr>
           <p:nvPr>
-            <p:ph type="ftr" idx="2"/>
+            <p:ph type="ftr" idx="1"/>
           </p:nvPr>
         </p:nvSpPr>
         <p:spPr/>
@@ -141,14 +142,14 @@
             <a:spLocks noGrp="1"/>
           </p:cNvSpPr>
           <p:nvPr>
-            <p:ph type="sldNum" idx="3"/>
+            <p:ph type="sldNum" idx="2"/>
           </p:nvPr>
         </p:nvSpPr>
         <p:spPr/>
         <p:txBody>
           <a:bodyPr/>
           <a:p>
-            <a:fld id="{A7142C52-466A-4EB9-909D-791C88CE68BC}" type="slidenum">
+            <a:fld id="{18A4C6A7-30A1-4755-BB94-D998F6AE295B}" type="slidenum">
               <a:t>&lt;#&gt;</a:t>
             </a:fld>
           </a:p>
@@ -161,7 +162,7 @@
             <a:spLocks noGrp="1"/>
           </p:cNvSpPr>
           <p:nvPr>
-            <p:ph type="dt" idx="1"/>
+            <p:ph type="dt" idx="3"/>
           </p:nvPr>
         </p:nvSpPr>
         <p:spPr/>
@@ -182,7 +183,7 @@
 
 <file path=ppt/slideLayouts/slideLayout2.xml><?xml version="1.0" encoding="utf-8"?>
 <p:sldLayout xmlns:a="http://schemas.openxmlformats.org/drawingml/2006/main" xmlns:p="http://schemas.openxmlformats.org/presentationml/2006/main" xmlns:r="http://schemas.openxmlformats.org/officeDocument/2006/relationships" xmlns:p14="http://schemas.microsoft.com/office/powerpoint/2010/main" xmlns:p15="http://schemas.microsoft.com/office/powerpoint/2012/main" xmlns:mc="http://schemas.openxmlformats.org/markup-compatibility/2006" type="title" preserve="1">
-  <p:cSld name="Default">
+  <p:cSld name="Default 1">
     <p:spTree>
       <p:nvGrpSpPr>
         <p:cNvPr id="1" name=""/>
@@ -199,7 +200,7 @@
       </p:grpSpPr>
       <p:sp>
         <p:nvSpPr>
-          <p:cNvPr id="7" name="PlaceHolder 1"/>
+          <p:cNvPr id="12" name="PlaceHolder 1"/>
           <p:cNvSpPr>
             <a:spLocks noGrp="1"/>
           </p:cNvSpPr>
@@ -210,7 +211,7 @@
         <p:spPr>
           <a:xfrm>
             <a:off x="504000" y="226080"/>
-            <a:ext cx="9071640" cy="946440"/>
+            <a:ext cx="9071280" cy="946080"/>
           </a:xfrm>
           <a:prstGeom prst="rect">
             <a:avLst/>
@@ -239,7 +240,7 @@
       </p:sp>
       <p:sp>
         <p:nvSpPr>
-          <p:cNvPr id="8" name="PlaceHolder 2"/>
+          <p:cNvPr id="13" name="PlaceHolder 2"/>
           <p:cNvSpPr>
             <a:spLocks noGrp="1"/>
           </p:cNvSpPr>
@@ -250,7 +251,7 @@
         <p:spPr>
           <a:xfrm>
             <a:off x="504000" y="1326600"/>
-            <a:ext cx="9071640" cy="3288240"/>
+            <a:ext cx="9071280" cy="3287880"/>
           </a:xfrm>
           <a:prstGeom prst="rect">
             <a:avLst/>
@@ -284,7 +285,7 @@
             <a:spLocks noGrp="1"/>
           </p:cNvSpPr>
           <p:nvPr>
-            <p:ph type="ftr" idx="2"/>
+            <p:ph type="ftr" idx="4"/>
           </p:nvPr>
         </p:nvSpPr>
         <p:spPr/>
@@ -304,14 +305,14 @@
             <a:spLocks noGrp="1"/>
           </p:cNvSpPr>
           <p:nvPr>
-            <p:ph type="sldNum" idx="3"/>
+            <p:ph type="sldNum" idx="5"/>
           </p:nvPr>
         </p:nvSpPr>
         <p:spPr/>
         <p:txBody>
           <a:bodyPr/>
           <a:p>
-            <a:fld id="{CC487ADC-5BD8-484A-9036-EEF4D3322C51}" type="slidenum">
+            <a:fld id="{DF100097-859C-4F65-ADF2-650B14D8A67E}" type="slidenum">
               <a:t>&lt;#&gt;</a:t>
             </a:fld>
           </a:p>
@@ -324,7 +325,7 @@
             <a:spLocks noGrp="1"/>
           </p:cNvSpPr>
           <p:nvPr>
-            <p:ph type="dt" idx="1"/>
+            <p:ph type="dt" idx="6"/>
           </p:nvPr>
         </p:nvSpPr>
         <p:spPr/>
@@ -373,7 +374,7 @@
         <p:spPr>
           <a:xfrm>
             <a:off x="504000" y="226080"/>
-            <a:ext cx="9071640" cy="946440"/>
+            <a:ext cx="9071280" cy="946080"/>
           </a:xfrm>
           <a:prstGeom prst="rect">
             <a:avLst/>
@@ -388,11 +389,11 @@
             <a:noAutofit/>
           </a:bodyPr>
           <a:p>
-            <a:pPr indent="0" algn="ctr">
-              <a:buNone/>
-            </a:pPr>
-            <a:r>
-              <a:rPr b="0" lang="es-CO" sz="4400" spc="-1" strike="noStrike">
+            <a:pPr indent="0">
+              <a:buNone/>
+            </a:pPr>
+            <a:r>
+              <a:rPr b="0" lang="es-CO" sz="1800" spc="-1" strike="noStrike">
                 <a:solidFill>
                   <a:srgbClr val="000000"/>
                 </a:solidFill>
@@ -400,7 +401,7 @@
               </a:rPr>
               <a:t>Click to edit the title text format</a:t>
             </a:r>
-            <a:endParaRPr b="0" lang="es-CO" sz="4400" spc="-1" strike="noStrike">
+            <a:endParaRPr b="0" lang="es-CO" sz="1800" spc="-1" strike="noStrike">
               <a:solidFill>
                 <a:srgbClr val="000000"/>
               </a:solidFill>
@@ -422,7 +423,7 @@
         <p:spPr>
           <a:xfrm>
             <a:off x="504000" y="1326600"/>
-            <a:ext cx="9071640" cy="3288240"/>
+            <a:ext cx="9071280" cy="3287880"/>
           </a:xfrm>
           <a:prstGeom prst="rect">
             <a:avLst/>
@@ -449,7 +450,7 @@
               <a:buChar char=""/>
             </a:pPr>
             <a:r>
-              <a:rPr b="0" lang="es-CO" sz="3200" spc="-1" strike="noStrike">
+              <a:rPr b="0" lang="es-CO" sz="1800" spc="-1" strike="noStrike">
                 <a:solidFill>
                   <a:srgbClr val="000000"/>
                 </a:solidFill>
@@ -457,7 +458,7 @@
               </a:rPr>
               <a:t>Click to edit the outline text format</a:t>
             </a:r>
-            <a:endParaRPr b="0" lang="es-CO" sz="3200" spc="-1" strike="noStrike">
+            <a:endParaRPr b="0" lang="es-CO" sz="1800" spc="-1" strike="noStrike">
               <a:solidFill>
                 <a:srgbClr val="000000"/>
               </a:solidFill>
@@ -477,7 +478,7 @@
               <a:buChar char=""/>
             </a:pPr>
             <a:r>
-              <a:rPr b="0" lang="es-CO" sz="2800" spc="-1" strike="noStrike">
+              <a:rPr b="0" lang="es-CO" sz="1800" spc="-1" strike="noStrike">
                 <a:solidFill>
                   <a:srgbClr val="000000"/>
                 </a:solidFill>
@@ -485,7 +486,7 @@
               </a:rPr>
               <a:t>Second Outline Level</a:t>
             </a:r>
-            <a:endParaRPr b="0" lang="es-CO" sz="2800" spc="-1" strike="noStrike">
+            <a:endParaRPr b="0" lang="es-CO" sz="1800" spc="-1" strike="noStrike">
               <a:solidFill>
                 <a:srgbClr val="000000"/>
               </a:solidFill>
@@ -505,7 +506,7 @@
               <a:buChar char=""/>
             </a:pPr>
             <a:r>
-              <a:rPr b="0" lang="es-CO" sz="2400" spc="-1" strike="noStrike">
+              <a:rPr b="0" lang="es-CO" sz="1800" spc="-1" strike="noStrike">
                 <a:solidFill>
                   <a:srgbClr val="000000"/>
                 </a:solidFill>
@@ -513,7 +514,7 @@
               </a:rPr>
               <a:t>Third Outline Level</a:t>
             </a:r>
-            <a:endParaRPr b="0" lang="es-CO" sz="2400" spc="-1" strike="noStrike">
+            <a:endParaRPr b="0" lang="es-CO" sz="1800" spc="-1" strike="noStrike">
               <a:solidFill>
                 <a:srgbClr val="000000"/>
               </a:solidFill>
@@ -533,7 +534,7 @@
               <a:buChar char=""/>
             </a:pPr>
             <a:r>
-              <a:rPr b="0" lang="es-CO" sz="2000" spc="-1" strike="noStrike">
+              <a:rPr b="0" lang="es-CO" sz="1800" spc="-1" strike="noStrike">
                 <a:solidFill>
                   <a:srgbClr val="000000"/>
                 </a:solidFill>
@@ -541,7 +542,7 @@
               </a:rPr>
               <a:t>Fourth Outline Level</a:t>
             </a:r>
-            <a:endParaRPr b="0" lang="es-CO" sz="2000" spc="-1" strike="noStrike">
+            <a:endParaRPr b="0" lang="es-CO" sz="1800" spc="-1" strike="noStrike">
               <a:solidFill>
                 <a:srgbClr val="000000"/>
               </a:solidFill>
@@ -561,7 +562,7 @@
               <a:buChar char=""/>
             </a:pPr>
             <a:r>
-              <a:rPr b="0" lang="es-CO" sz="2000" spc="-1" strike="noStrike">
+              <a:rPr b="0" lang="es-CO" sz="1800" spc="-1" strike="noStrike">
                 <a:solidFill>
                   <a:srgbClr val="000000"/>
                 </a:solidFill>
@@ -569,7 +570,7 @@
               </a:rPr>
               <a:t>Fifth Outline Level</a:t>
             </a:r>
-            <a:endParaRPr b="0" lang="es-CO" sz="2000" spc="-1" strike="noStrike">
+            <a:endParaRPr b="0" lang="es-CO" sz="1800" spc="-1" strike="noStrike">
               <a:solidFill>
                 <a:srgbClr val="000000"/>
               </a:solidFill>
@@ -589,7 +590,7 @@
               <a:buChar char=""/>
             </a:pPr>
             <a:r>
-              <a:rPr b="0" lang="es-CO" sz="2000" spc="-1" strike="noStrike">
+              <a:rPr b="0" lang="es-CO" sz="1800" spc="-1" strike="noStrike">
                 <a:solidFill>
                   <a:srgbClr val="000000"/>
                 </a:solidFill>
@@ -597,7 +598,7 @@
               </a:rPr>
               <a:t>Sixth Outline Level</a:t>
             </a:r>
-            <a:endParaRPr b="0" lang="es-CO" sz="2000" spc="-1" strike="noStrike">
+            <a:endParaRPr b="0" lang="es-CO" sz="1800" spc="-1" strike="noStrike">
               <a:solidFill>
                 <a:srgbClr val="000000"/>
               </a:solidFill>
@@ -617,7 +618,7 @@
               <a:buChar char=""/>
             </a:pPr>
             <a:r>
-              <a:rPr b="0" lang="es-CO" sz="2000" spc="-1" strike="noStrike">
+              <a:rPr b="0" lang="es-CO" sz="1800" spc="-1" strike="noStrike">
                 <a:solidFill>
                   <a:srgbClr val="000000"/>
                 </a:solidFill>
@@ -625,7 +626,7 @@
               </a:rPr>
               <a:t>Seventh Outline Level</a:t>
             </a:r>
-            <a:endParaRPr b="0" lang="es-CO" sz="2000" spc="-1" strike="noStrike">
+            <a:endParaRPr b="0" lang="es-CO" sz="1800" spc="-1" strike="noStrike">
               <a:solidFill>
                 <a:srgbClr val="000000"/>
               </a:solidFill>
@@ -641,13 +642,157 @@
             <a:spLocks noGrp="1"/>
           </p:cNvSpPr>
           <p:nvPr>
-            <p:ph type="dt" idx="1"/>
+            <p:ph type="ftr" idx="1"/>
+          </p:nvPr>
+        </p:nvSpPr>
+        <p:spPr>
+          <a:xfrm>
+            <a:off x="3447360" y="5165280"/>
+            <a:ext cx="3194640" cy="390240"/>
+          </a:xfrm>
+          <a:prstGeom prst="rect">
+            <a:avLst/>
+          </a:prstGeom>
+          <a:noFill/>
+          <a:ln w="0">
+            <a:noFill/>
+          </a:ln>
+        </p:spPr>
+        <p:txBody>
+          <a:bodyPr lIns="0" rIns="0" tIns="0" bIns="0" anchor="t">
+            <a:noAutofit/>
+          </a:bodyPr>
+          <a:lstStyle>
+            <a:lvl1pPr indent="0" algn="ctr">
+              <a:lnSpc>
+                <a:spcPct val="100000"/>
+              </a:lnSpc>
+              <a:buNone/>
+              <a:tabLst>
+                <a:tab algn="l" pos="0"/>
+              </a:tabLst>
+              <a:defRPr b="0" lang="es-CO" sz="1400" spc="-1" strike="noStrike">
+                <a:solidFill>
+                  <a:srgbClr val="000000"/>
+                </a:solidFill>
+                <a:latin typeface="Times New Roman"/>
+              </a:defRPr>
+            </a:lvl1pPr>
+          </a:lstStyle>
+          <a:p>
+            <a:pPr indent="0" algn="ctr">
+              <a:lnSpc>
+                <a:spcPct val="100000"/>
+              </a:lnSpc>
+              <a:buNone/>
+              <a:tabLst>
+                <a:tab algn="l" pos="0"/>
+              </a:tabLst>
+            </a:pPr>
+            <a:r>
+              <a:rPr b="0" lang="es-CO" sz="1400" spc="-1" strike="noStrike">
+                <a:solidFill>
+                  <a:srgbClr val="000000"/>
+                </a:solidFill>
+                <a:latin typeface="Times New Roman"/>
+              </a:rPr>
+              <a:t>&lt;footer&gt;</a:t>
+            </a:r>
+            <a:endParaRPr b="0" lang="es-CO" sz="1400" spc="-1" strike="noStrike">
+              <a:solidFill>
+                <a:srgbClr val="000000"/>
+              </a:solidFill>
+              <a:latin typeface="Times New Roman"/>
+            </a:endParaRPr>
+          </a:p>
+        </p:txBody>
+      </p:sp>
+      <p:sp>
+        <p:nvSpPr>
+          <p:cNvPr id="3" name="PlaceHolder 4"/>
+          <p:cNvSpPr>
+            <a:spLocks noGrp="1"/>
+          </p:cNvSpPr>
+          <p:nvPr>
+            <p:ph type="sldNum" idx="2"/>
+          </p:nvPr>
+        </p:nvSpPr>
+        <p:spPr>
+          <a:xfrm>
+            <a:off x="7227360" y="5165280"/>
+            <a:ext cx="2347920" cy="390240"/>
+          </a:xfrm>
+          <a:prstGeom prst="rect">
+            <a:avLst/>
+          </a:prstGeom>
+          <a:noFill/>
+          <a:ln w="0">
+            <a:noFill/>
+          </a:ln>
+        </p:spPr>
+        <p:txBody>
+          <a:bodyPr lIns="0" rIns="0" tIns="0" bIns="0" anchor="t">
+            <a:noAutofit/>
+          </a:bodyPr>
+          <a:lstStyle>
+            <a:lvl1pPr indent="0" algn="r">
+              <a:lnSpc>
+                <a:spcPct val="100000"/>
+              </a:lnSpc>
+              <a:buNone/>
+              <a:tabLst>
+                <a:tab algn="l" pos="0"/>
+              </a:tabLst>
+              <a:defRPr b="0" lang="es-CO" sz="1400" spc="-1" strike="noStrike">
+                <a:solidFill>
+                  <a:srgbClr val="000000"/>
+                </a:solidFill>
+                <a:latin typeface="Times New Roman"/>
+              </a:defRPr>
+            </a:lvl1pPr>
+          </a:lstStyle>
+          <a:p>
+            <a:pPr indent="0" algn="r">
+              <a:lnSpc>
+                <a:spcPct val="100000"/>
+              </a:lnSpc>
+              <a:buNone/>
+              <a:tabLst>
+                <a:tab algn="l" pos="0"/>
+              </a:tabLst>
+            </a:pPr>
+            <a:fld id="{F6E3EE5D-47E8-48F1-8BDE-AC70DDD25D7B}" type="slidenum">
+              <a:rPr b="0" lang="es-CO" sz="1400" spc="-1" strike="noStrike">
+                <a:solidFill>
+                  <a:srgbClr val="000000"/>
+                </a:solidFill>
+                <a:latin typeface="Times New Roman"/>
+              </a:rPr>
+              <a:t>&lt;number&gt;</a:t>
+            </a:fld>
+            <a:endParaRPr b="0" lang="es-CO" sz="1400" spc="-1" strike="noStrike">
+              <a:solidFill>
+                <a:srgbClr val="000000"/>
+              </a:solidFill>
+              <a:latin typeface="Times New Roman"/>
+            </a:endParaRPr>
+          </a:p>
+        </p:txBody>
+      </p:sp>
+      <p:sp>
+        <p:nvSpPr>
+          <p:cNvPr id="4" name="PlaceHolder 5"/>
+          <p:cNvSpPr>
+            <a:spLocks noGrp="1"/>
+          </p:cNvSpPr>
+          <p:nvPr>
+            <p:ph type="dt" idx="3"/>
           </p:nvPr>
         </p:nvSpPr>
         <p:spPr>
           <a:xfrm>
             <a:off x="504000" y="5165280"/>
-            <a:ext cx="2348280" cy="390600"/>
+            <a:ext cx="2347920" cy="390240"/>
           </a:xfrm>
           <a:prstGeom prst="rect">
             <a:avLst/>
@@ -694,20 +839,95 @@
           </a:p>
         </p:txBody>
       </p:sp>
-      <p:sp>
-        <p:nvSpPr>
-          <p:cNvPr id="3" name="PlaceHolder 4"/>
-          <p:cNvSpPr>
-            <a:spLocks noGrp="1"/>
-          </p:cNvSpPr>
-          <p:nvPr>
-            <p:ph type="ftr" idx="2"/>
+    </p:spTree>
+  </p:cSld>
+  <p:clrMap bg1="lt1" bg2="lt2" tx1="dk1" tx2="dk2" accent1="accent1" accent2="accent2" accent3="accent3" accent4="accent4" accent5="accent5" accent6="accent6" hlink="hlink" folHlink="folHlink"/>
+  <p:sldLayoutIdLst>
+    <p:sldLayoutId id="2147483649" r:id="rId2"/>
+  </p:sldLayoutIdLst>
+</p:sldMaster>
+</file>
+
+<file path=ppt/slideMasters/slideMaster2.xml><?xml version="1.0" encoding="utf-8"?>
+<p:sldMaster xmlns:a="http://schemas.openxmlformats.org/drawingml/2006/main" xmlns:p="http://schemas.openxmlformats.org/presentationml/2006/main" xmlns:r="http://schemas.openxmlformats.org/officeDocument/2006/relationships" xmlns:p14="http://schemas.microsoft.com/office/powerpoint/2010/main" xmlns:p15="http://schemas.microsoft.com/office/powerpoint/2012/main" xmlns:mc="http://schemas.openxmlformats.org/markup-compatibility/2006">
+  <p:cSld>
+    <p:spTree>
+      <p:nvGrpSpPr>
+        <p:cNvPr id="1" name=""/>
+        <p:cNvGrpSpPr/>
+        <p:nvPr/>
+      </p:nvGrpSpPr>
+      <p:grpSpPr>
+        <a:xfrm>
+          <a:off x="0" y="0"/>
+          <a:ext cx="0" cy="0"/>
+          <a:chOff x="0" y="0"/>
+          <a:chExt cx="0" cy="0"/>
+        </a:xfrm>
+      </p:grpSpPr>
+      <p:sp>
+        <p:nvSpPr>
+          <p:cNvPr id="7" name="PlaceHolder 1"/>
+          <p:cNvSpPr>
+            <a:spLocks noGrp="1"/>
+          </p:cNvSpPr>
+          <p:nvPr>
+            <p:ph type="title"/>
+          </p:nvPr>
+        </p:nvSpPr>
+        <p:spPr>
+          <a:xfrm>
+            <a:off x="504000" y="226080"/>
+            <a:ext cx="9071280" cy="946080"/>
+          </a:xfrm>
+          <a:prstGeom prst="rect">
+            <a:avLst/>
+          </a:prstGeom>
+          <a:noFill/>
+          <a:ln w="0">
+            <a:noFill/>
+          </a:ln>
+        </p:spPr>
+        <p:txBody>
+          <a:bodyPr lIns="0" rIns="0" tIns="0" bIns="0" anchor="ctr">
+            <a:noAutofit/>
+          </a:bodyPr>
+          <a:p>
+            <a:pPr indent="0">
+              <a:buNone/>
+            </a:pPr>
+            <a:r>
+              <a:rPr b="0" lang="es-CO" sz="1800" spc="-1" strike="noStrike">
+                <a:solidFill>
+                  <a:srgbClr val="000000"/>
+                </a:solidFill>
+                <a:latin typeface="Arial"/>
+              </a:rPr>
+              <a:t>Click to edit the title text format</a:t>
+            </a:r>
+            <a:endParaRPr b="0" lang="es-CO" sz="1800" spc="-1" strike="noStrike">
+              <a:solidFill>
+                <a:srgbClr val="000000"/>
+              </a:solidFill>
+              <a:latin typeface="Arial"/>
+            </a:endParaRPr>
+          </a:p>
+        </p:txBody>
+      </p:sp>
+      <p:sp>
+        <p:nvSpPr>
+          <p:cNvPr id="8" name="PlaceHolder 2"/>
+          <p:cNvSpPr>
+            <a:spLocks noGrp="1"/>
+          </p:cNvSpPr>
+          <p:nvPr>
+            <p:ph type="ftr" idx="4"/>
           </p:nvPr>
         </p:nvSpPr>
         <p:spPr>
           <a:xfrm>
             <a:off x="3447360" y="5165280"/>
-            <a:ext cx="3195000" cy="390600"/>
+            <a:ext cx="3194640" cy="390240"/>
           </a:xfrm>
           <a:prstGeom prst="rect">
             <a:avLst/>
@@ -723,7 +943,13 @@
           </a:bodyPr>
           <a:lstStyle>
             <a:lvl1pPr indent="0" algn="ctr">
-              <a:buNone/>
+              <a:lnSpc>
+                <a:spcPct val="100000"/>
+              </a:lnSpc>
+              <a:buNone/>
+              <a:tabLst>
+                <a:tab algn="l" pos="0"/>
+              </a:tabLst>
               <a:defRPr b="0" lang="es-CO" sz="1400" spc="-1" strike="noStrike">
                 <a:solidFill>
                   <a:srgbClr val="000000"/>
@@ -734,7 +960,13 @@
           </a:lstStyle>
           <a:p>
             <a:pPr indent="0" algn="ctr">
-              <a:buNone/>
+              <a:lnSpc>
+                <a:spcPct val="100000"/>
+              </a:lnSpc>
+              <a:buNone/>
+              <a:tabLst>
+                <a:tab algn="l" pos="0"/>
+              </a:tabLst>
             </a:pPr>
             <a:r>
               <a:rPr b="0" lang="es-CO" sz="1400" spc="-1" strike="noStrike">
@@ -756,18 +988,18 @@
       </p:sp>
       <p:sp>
         <p:nvSpPr>
-          <p:cNvPr id="4" name="PlaceHolder 5"/>
-          <p:cNvSpPr>
-            <a:spLocks noGrp="1"/>
-          </p:cNvSpPr>
-          <p:nvPr>
-            <p:ph type="sldNum" idx="3"/>
+          <p:cNvPr id="9" name="PlaceHolder 3"/>
+          <p:cNvSpPr>
+            <a:spLocks noGrp="1"/>
+          </p:cNvSpPr>
+          <p:nvPr>
+            <p:ph type="sldNum" idx="5"/>
           </p:nvPr>
         </p:nvSpPr>
         <p:spPr>
           <a:xfrm>
             <a:off x="7227360" y="5165280"/>
-            <a:ext cx="2348280" cy="390600"/>
+            <a:ext cx="2347920" cy="390240"/>
           </a:xfrm>
           <a:prstGeom prst="rect">
             <a:avLst/>
@@ -783,7 +1015,13 @@
           </a:bodyPr>
           <a:lstStyle>
             <a:lvl1pPr indent="0" algn="r">
-              <a:buNone/>
+              <a:lnSpc>
+                <a:spcPct val="100000"/>
+              </a:lnSpc>
+              <a:buNone/>
+              <a:tabLst>
+                <a:tab algn="l" pos="0"/>
+              </a:tabLst>
               <a:defRPr b="0" lang="es-CO" sz="1400" spc="-1" strike="noStrike">
                 <a:solidFill>
                   <a:srgbClr val="000000"/>
@@ -794,9 +1032,15 @@
           </a:lstStyle>
           <a:p>
             <a:pPr indent="0" algn="r">
-              <a:buNone/>
-            </a:pPr>
-            <a:fld id="{DB3992C4-A275-4820-896F-09DFCB3C3974}" type="slidenum">
+              <a:lnSpc>
+                <a:spcPct val="100000"/>
+              </a:lnSpc>
+              <a:buNone/>
+              <a:tabLst>
+                <a:tab algn="l" pos="0"/>
+              </a:tabLst>
+            </a:pPr>
+            <a:fld id="{B1C5379E-C636-490E-AC2E-837185B78D37}" type="slidenum">
               <a:rPr b="0" lang="es-CO" sz="1400" spc="-1" strike="noStrike">
                 <a:solidFill>
                   <a:srgbClr val="000000"/>
@@ -810,6 +1054,291 @@
                 <a:srgbClr val="000000"/>
               </a:solidFill>
               <a:latin typeface="Times New Roman"/>
+            </a:endParaRPr>
+          </a:p>
+        </p:txBody>
+      </p:sp>
+      <p:sp>
+        <p:nvSpPr>
+          <p:cNvPr id="10" name="PlaceHolder 4"/>
+          <p:cNvSpPr>
+            <a:spLocks noGrp="1"/>
+          </p:cNvSpPr>
+          <p:nvPr>
+            <p:ph type="dt" idx="6"/>
+          </p:nvPr>
+        </p:nvSpPr>
+        <p:spPr>
+          <a:xfrm>
+            <a:off x="504000" y="5165280"/>
+            <a:ext cx="2347920" cy="390240"/>
+          </a:xfrm>
+          <a:prstGeom prst="rect">
+            <a:avLst/>
+          </a:prstGeom>
+          <a:noFill/>
+          <a:ln w="0">
+            <a:noFill/>
+          </a:ln>
+        </p:spPr>
+        <p:txBody>
+          <a:bodyPr lIns="0" rIns="0" tIns="0" bIns="0" anchor="t">
+            <a:noAutofit/>
+          </a:bodyPr>
+          <a:lstStyle>
+            <a:lvl1pPr indent="0">
+              <a:buNone/>
+              <a:defRPr b="0" lang="es-CO" sz="1400" spc="-1" strike="noStrike">
+                <a:solidFill>
+                  <a:srgbClr val="000000"/>
+                </a:solidFill>
+                <a:latin typeface="Times New Roman"/>
+              </a:defRPr>
+            </a:lvl1pPr>
+          </a:lstStyle>
+          <a:p>
+            <a:pPr indent="0">
+              <a:buNone/>
+            </a:pPr>
+            <a:r>
+              <a:rPr b="0" lang="es-CO" sz="1400" spc="-1" strike="noStrike">
+                <a:solidFill>
+                  <a:srgbClr val="000000"/>
+                </a:solidFill>
+                <a:latin typeface="Times New Roman"/>
+              </a:rPr>
+              <a:t>&lt;date/time&gt;</a:t>
+            </a:r>
+            <a:endParaRPr b="0" lang="es-CO" sz="1400" spc="-1" strike="noStrike">
+              <a:solidFill>
+                <a:srgbClr val="000000"/>
+              </a:solidFill>
+              <a:latin typeface="Times New Roman"/>
+            </a:endParaRPr>
+          </a:p>
+        </p:txBody>
+      </p:sp>
+      <p:sp>
+        <p:nvSpPr>
+          <p:cNvPr id="11" name="PlaceHolder 5"/>
+          <p:cNvSpPr>
+            <a:spLocks noGrp="1"/>
+          </p:cNvSpPr>
+          <p:nvPr>
+            <p:ph type="body"/>
+          </p:nvPr>
+        </p:nvSpPr>
+        <p:spPr>
+          <a:xfrm>
+            <a:off x="504000" y="1326600"/>
+            <a:ext cx="9072000" cy="3288600"/>
+          </a:xfrm>
+          <a:prstGeom prst="rect">
+            <a:avLst/>
+          </a:prstGeom>
+          <a:noFill/>
+          <a:ln w="0">
+            <a:noFill/>
+          </a:ln>
+        </p:spPr>
+        <p:txBody>
+          <a:bodyPr lIns="0" rIns="0" tIns="0" bIns="0" anchor="t">
+            <a:normAutofit/>
+          </a:bodyPr>
+          <a:p>
+            <a:pPr marL="432000" indent="-324000">
+              <a:spcBef>
+                <a:spcPts val="1417"/>
+              </a:spcBef>
+              <a:buClr>
+                <a:srgbClr val="000000"/>
+              </a:buClr>
+              <a:buSzPct val="45000"/>
+              <a:buFont typeface="Wingdings" charset="2"/>
+              <a:buChar char=""/>
+            </a:pPr>
+            <a:r>
+              <a:rPr b="0" lang="es-CO" sz="3200" spc="-1" strike="noStrike">
+                <a:solidFill>
+                  <a:srgbClr val="000000"/>
+                </a:solidFill>
+                <a:latin typeface="Arial"/>
+              </a:rPr>
+              <a:t>Click to edit the outline text format</a:t>
+            </a:r>
+            <a:endParaRPr b="0" lang="es-CO" sz="3200" spc="-1" strike="noStrike">
+              <a:solidFill>
+                <a:srgbClr val="000000"/>
+              </a:solidFill>
+              <a:latin typeface="Arial"/>
+            </a:endParaRPr>
+          </a:p>
+          <a:p>
+            <a:pPr lvl="1" marL="864000" indent="-324000">
+              <a:spcBef>
+                <a:spcPts val="1134"/>
+              </a:spcBef>
+              <a:buClr>
+                <a:srgbClr val="000000"/>
+              </a:buClr>
+              <a:buSzPct val="75000"/>
+              <a:buFont typeface="Symbol" charset="2"/>
+              <a:buChar char=""/>
+            </a:pPr>
+            <a:r>
+              <a:rPr b="0" lang="es-CO" sz="2800" spc="-1" strike="noStrike">
+                <a:solidFill>
+                  <a:srgbClr val="000000"/>
+                </a:solidFill>
+                <a:latin typeface="Arial"/>
+              </a:rPr>
+              <a:t>Second Outline Level</a:t>
+            </a:r>
+            <a:endParaRPr b="0" lang="es-CO" sz="2800" spc="-1" strike="noStrike">
+              <a:solidFill>
+                <a:srgbClr val="000000"/>
+              </a:solidFill>
+              <a:latin typeface="Arial"/>
+            </a:endParaRPr>
+          </a:p>
+          <a:p>
+            <a:pPr lvl="2" marL="1296000" indent="-288000">
+              <a:spcBef>
+                <a:spcPts val="850"/>
+              </a:spcBef>
+              <a:buClr>
+                <a:srgbClr val="000000"/>
+              </a:buClr>
+              <a:buSzPct val="45000"/>
+              <a:buFont typeface="Wingdings" charset="2"/>
+              <a:buChar char=""/>
+            </a:pPr>
+            <a:r>
+              <a:rPr b="0" lang="es-CO" sz="2400" spc="-1" strike="noStrike">
+                <a:solidFill>
+                  <a:srgbClr val="000000"/>
+                </a:solidFill>
+                <a:latin typeface="Arial"/>
+              </a:rPr>
+              <a:t>Third Outline Level</a:t>
+            </a:r>
+            <a:endParaRPr b="0" lang="es-CO" sz="2400" spc="-1" strike="noStrike">
+              <a:solidFill>
+                <a:srgbClr val="000000"/>
+              </a:solidFill>
+              <a:latin typeface="Arial"/>
+            </a:endParaRPr>
+          </a:p>
+          <a:p>
+            <a:pPr lvl="3" marL="1728000" indent="-216000">
+              <a:spcBef>
+                <a:spcPts val="567"/>
+              </a:spcBef>
+              <a:buClr>
+                <a:srgbClr val="000000"/>
+              </a:buClr>
+              <a:buSzPct val="75000"/>
+              <a:buFont typeface="Symbol" charset="2"/>
+              <a:buChar char=""/>
+            </a:pPr>
+            <a:r>
+              <a:rPr b="0" lang="es-CO" sz="2000" spc="-1" strike="noStrike">
+                <a:solidFill>
+                  <a:srgbClr val="000000"/>
+                </a:solidFill>
+                <a:latin typeface="Arial"/>
+              </a:rPr>
+              <a:t>Fourth Outline Level</a:t>
+            </a:r>
+            <a:endParaRPr b="0" lang="es-CO" sz="2000" spc="-1" strike="noStrike">
+              <a:solidFill>
+                <a:srgbClr val="000000"/>
+              </a:solidFill>
+              <a:latin typeface="Arial"/>
+            </a:endParaRPr>
+          </a:p>
+          <a:p>
+            <a:pPr lvl="4" marL="2160000" indent="-216000">
+              <a:spcBef>
+                <a:spcPts val="283"/>
+              </a:spcBef>
+              <a:buClr>
+                <a:srgbClr val="000000"/>
+              </a:buClr>
+              <a:buSzPct val="45000"/>
+              <a:buFont typeface="Wingdings" charset="2"/>
+              <a:buChar char=""/>
+            </a:pPr>
+            <a:r>
+              <a:rPr b="0" lang="es-CO" sz="2000" spc="-1" strike="noStrike">
+                <a:solidFill>
+                  <a:srgbClr val="000000"/>
+                </a:solidFill>
+                <a:latin typeface="Arial"/>
+              </a:rPr>
+              <a:t>Fifth Outline Level</a:t>
+            </a:r>
+            <a:endParaRPr b="0" lang="es-CO" sz="2000" spc="-1" strike="noStrike">
+              <a:solidFill>
+                <a:srgbClr val="000000"/>
+              </a:solidFill>
+              <a:latin typeface="Arial"/>
+            </a:endParaRPr>
+          </a:p>
+          <a:p>
+            <a:pPr lvl="5" marL="2592000" indent="-216000">
+              <a:spcBef>
+                <a:spcPts val="283"/>
+              </a:spcBef>
+              <a:buClr>
+                <a:srgbClr val="000000"/>
+              </a:buClr>
+              <a:buSzPct val="45000"/>
+              <a:buFont typeface="Wingdings" charset="2"/>
+              <a:buChar char=""/>
+            </a:pPr>
+            <a:r>
+              <a:rPr b="0" lang="es-CO" sz="2000" spc="-1" strike="noStrike">
+                <a:solidFill>
+                  <a:srgbClr val="000000"/>
+                </a:solidFill>
+                <a:latin typeface="Arial"/>
+              </a:rPr>
+              <a:t>Sixth Outline Level</a:t>
+            </a:r>
+            <a:endParaRPr b="0" lang="es-CO" sz="2000" spc="-1" strike="noStrike">
+              <a:solidFill>
+                <a:srgbClr val="000000"/>
+              </a:solidFill>
+              <a:latin typeface="Arial"/>
+            </a:endParaRPr>
+          </a:p>
+          <a:p>
+            <a:pPr lvl="6" marL="3024000" indent="-216000">
+              <a:spcBef>
+                <a:spcPts val="283"/>
+              </a:spcBef>
+              <a:buClr>
+                <a:srgbClr val="000000"/>
+              </a:buClr>
+              <a:buSzPct val="45000"/>
+              <a:buFont typeface="Wingdings" charset="2"/>
+              <a:buChar char=""/>
+            </a:pPr>
+            <a:r>
+              <a:rPr b="0" lang="es-CO" sz="2000" spc="-1" strike="noStrike">
+                <a:solidFill>
+                  <a:srgbClr val="000000"/>
+                </a:solidFill>
+                <a:latin typeface="Arial"/>
+              </a:rPr>
+              <a:t>Seventh Outline Level</a:t>
+            </a:r>
+            <a:endParaRPr b="0" lang="es-CO" sz="2000" spc="-1" strike="noStrike">
+              <a:solidFill>
+                <a:srgbClr val="000000"/>
+              </a:solidFill>
+              <a:latin typeface="Arial"/>
             </a:endParaRPr>
           </a:p>
         </p:txBody>
@@ -818,8 +1347,7 @@
   </p:cSld>
   <p:clrMap bg1="lt1" bg2="lt2" tx1="dk1" tx2="dk2" accent1="accent1" accent2="accent2" accent3="accent3" accent4="accent4" accent5="accent5" accent6="accent6" hlink="hlink" folHlink="folHlink"/>
   <p:sldLayoutIdLst>
-    <p:sldLayoutId id="2147483649" r:id="rId2"/>
-    <p:sldLayoutId id="2147483650" r:id="rId3"/>
+    <p:sldLayoutId id="2147483651" r:id="rId2"/>
   </p:sldLayoutIdLst>
 </p:sldMaster>
 </file>
@@ -843,7 +1371,7 @@
       </p:grpSpPr>
       <p:sp>
         <p:nvSpPr>
-          <p:cNvPr id="9" name="PlaceHolder 1"/>
+          <p:cNvPr id="14" name="PlaceHolder 1"/>
           <p:cNvSpPr>
             <a:spLocks noGrp="1"/>
           </p:cNvSpPr>
@@ -854,7 +1382,7 @@
         <p:spPr>
           <a:xfrm>
             <a:off x="180000" y="74160"/>
-            <a:ext cx="9071640" cy="1250280"/>
+            <a:ext cx="9071280" cy="1249920"/>
           </a:xfrm>
           <a:prstGeom prst="rect">
             <a:avLst/>
@@ -870,7 +1398,13 @@
           </a:bodyPr>
           <a:p>
             <a:pPr indent="0" algn="ctr">
-              <a:buNone/>
+              <a:lnSpc>
+                <a:spcPct val="100000"/>
+              </a:lnSpc>
+              <a:buNone/>
+              <a:tabLst>
+                <a:tab algn="l" pos="0"/>
+              </a:tabLst>
             </a:pPr>
             <a:r>
               <a:rPr b="0" lang="es-CO" sz="4400" spc="-1" strike="noStrike">
@@ -879,7 +1413,7 @@
                 </a:solidFill>
                 <a:latin typeface="Arial"/>
               </a:rPr>
-              <a:t>SVM las librerias necesarias para clasificación binaria</a:t>
+              <a:t>SVM y Random Forest, las librerias necesarias para clasificación binaria</a:t>
             </a:r>
             <a:endParaRPr b="0" lang="es-CO" sz="4400" spc="-1" strike="noStrike">
               <a:solidFill>
@@ -892,7 +1426,7 @@
       </p:sp>
       <p:sp>
         <p:nvSpPr>
-          <p:cNvPr id="10" name="PlaceHolder 2"/>
+          <p:cNvPr id="15" name="PlaceHolder 2"/>
           <p:cNvSpPr>
             <a:spLocks noGrp="1"/>
           </p:cNvSpPr>
@@ -903,7 +1437,7 @@
         <p:spPr>
           <a:xfrm>
             <a:off x="504000" y="1326600"/>
-            <a:ext cx="9071640" cy="3288240"/>
+            <a:ext cx="9071280" cy="3287880"/>
           </a:xfrm>
           <a:prstGeom prst="rect">
             <a:avLst/>
@@ -919,7 +1453,13 @@
           </a:bodyPr>
           <a:p>
             <a:pPr indent="0" algn="ctr">
-              <a:buNone/>
+              <a:lnSpc>
+                <a:spcPct val="100000"/>
+              </a:lnSpc>
+              <a:buNone/>
+              <a:tabLst>
+                <a:tab algn="l" pos="0"/>
+              </a:tabLst>
             </a:pPr>
             <a:r>
               <a:rPr b="0" lang="es-CO" sz="3200" spc="-1" strike="noStrike">
@@ -939,7 +1479,13 @@
           </a:p>
           <a:p>
             <a:pPr indent="0" algn="ctr">
-              <a:buNone/>
+              <a:lnSpc>
+                <a:spcPct val="100000"/>
+              </a:lnSpc>
+              <a:buNone/>
+              <a:tabLst>
+                <a:tab algn="l" pos="0"/>
+              </a:tabLst>
             </a:pPr>
             <a:r>
               <a:rPr b="0" lang="es-CO" sz="3200" spc="-1" strike="noStrike">
@@ -959,7 +1505,13 @@
           </a:p>
           <a:p>
             <a:pPr indent="0" algn="ctr">
-              <a:buNone/>
+              <a:lnSpc>
+                <a:spcPct val="100000"/>
+              </a:lnSpc>
+              <a:buNone/>
+              <a:tabLst>
+                <a:tab algn="l" pos="0"/>
+              </a:tabLst>
             </a:pPr>
             <a:r>
               <a:rPr b="0" lang="es-CO" sz="3200" spc="-1" strike="noStrike">
@@ -981,14 +1533,14 @@
       </p:sp>
       <p:sp>
         <p:nvSpPr>
-          <p:cNvPr id="11" name=""/>
-          <p:cNvSpPr txBox="1"/>
+          <p:cNvPr id="16" name=""/>
+          <p:cNvSpPr/>
           <p:nvPr/>
         </p:nvSpPr>
         <p:spPr>
           <a:xfrm>
             <a:off x="0" y="5152680"/>
-            <a:ext cx="3822840" cy="427320"/>
+            <a:ext cx="3822480" cy="426960"/>
           </a:xfrm>
           <a:prstGeom prst="rect">
             <a:avLst/>
@@ -998,12 +1550,23 @@
             <a:noFill/>
           </a:ln>
         </p:spPr>
+        <p:style>
+          <a:lnRef idx="0"/>
+          <a:fillRef idx="0"/>
+          <a:effectRef idx="0"/>
+          <a:fontRef idx="minor"/>
+        </p:style>
         <p:txBody>
           <a:bodyPr wrap="none" lIns="90000" rIns="90000" tIns="45000" bIns="45000" anchor="t">
             <a:noAutofit/>
           </a:bodyPr>
           <a:p>
-            <a:fld id="{0EF10A93-86F0-48E8-8607-9D4F1A62210D}" type="slidenum">
+            <a:pPr>
+              <a:lnSpc>
+                <a:spcPct val="100000"/>
+              </a:lnSpc>
+            </a:pPr>
+            <a:fld id="{FAB44166-F8A9-4F36-8C21-96BC5497E8B8}" type="slidenum">
               <a:rPr b="0" lang="es-CO" sz="2400" spc="-1" strike="noStrike">
                 <a:solidFill>
                   <a:srgbClr val="000000"/>
@@ -1016,14 +1579,14 @@
               <a:solidFill>
                 <a:srgbClr val="000000"/>
               </a:solidFill>
-              <a:latin typeface="Times New Roman"/>
+              <a:latin typeface="Arial"/>
             </a:endParaRPr>
           </a:p>
         </p:txBody>
       </p:sp>
       <p:pic>
         <p:nvPicPr>
-          <p:cNvPr id="12" name="" descr=""/>
+          <p:cNvPr id="17" name="" descr=""/>
           <p:cNvPicPr/>
           <p:nvPr/>
         </p:nvPicPr>
@@ -1034,7 +1597,7 @@
         <p:spPr>
           <a:xfrm>
             <a:off x="180000" y="1440000"/>
-            <a:ext cx="3527640" cy="1984320"/>
+            <a:ext cx="3527280" cy="1983960"/>
           </a:xfrm>
           <a:prstGeom prst="rect">
             <a:avLst/>
@@ -1046,7 +1609,7 @@
       </p:pic>
       <p:pic>
         <p:nvPicPr>
-          <p:cNvPr id="13" name="" descr=""/>
+          <p:cNvPr id="18" name="" descr=""/>
           <p:cNvPicPr/>
           <p:nvPr/>
         </p:nvPicPr>
@@ -1057,7 +1620,7 @@
         <p:spPr>
           <a:xfrm>
             <a:off x="7020000" y="1324440"/>
-            <a:ext cx="2790720" cy="1502280"/>
+            <a:ext cx="2790360" cy="1501920"/>
           </a:xfrm>
           <a:prstGeom prst="rect">
             <a:avLst/>
@@ -1069,7 +1632,7 @@
       </p:pic>
       <p:pic>
         <p:nvPicPr>
-          <p:cNvPr id="14" name="" descr=""/>
+          <p:cNvPr id="19" name="" descr=""/>
           <p:cNvPicPr/>
           <p:nvPr/>
         </p:nvPicPr>
@@ -1080,7 +1643,7 @@
         <p:spPr>
           <a:xfrm>
             <a:off x="3822840" y="3960000"/>
-            <a:ext cx="2238120" cy="1323000"/>
+            <a:ext cx="2237760" cy="1322640"/>
           </a:xfrm>
           <a:prstGeom prst="rect">
             <a:avLst/>
@@ -1122,7 +1685,7 @@
       </p:grpSpPr>
       <p:sp>
         <p:nvSpPr>
-          <p:cNvPr id="15" name="PlaceHolder 1"/>
+          <p:cNvPr id="20" name="PlaceHolder 1"/>
           <p:cNvSpPr>
             <a:spLocks noGrp="1"/>
           </p:cNvSpPr>
@@ -1133,7 +1696,7 @@
         <p:spPr>
           <a:xfrm>
             <a:off x="504000" y="74160"/>
-            <a:ext cx="9071640" cy="1250280"/>
+            <a:ext cx="9071280" cy="1249920"/>
           </a:xfrm>
           <a:prstGeom prst="rect">
             <a:avLst/>
@@ -1149,7 +1712,13 @@
           </a:bodyPr>
           <a:p>
             <a:pPr indent="0" algn="ctr">
-              <a:buNone/>
+              <a:lnSpc>
+                <a:spcPct val="100000"/>
+              </a:lnSpc>
+              <a:buNone/>
+              <a:tabLst>
+                <a:tab algn="l" pos="0"/>
+              </a:tabLst>
             </a:pPr>
             <a:r>
               <a:rPr b="0" lang="es-CO" sz="4400" spc="-1" strike="noStrike">
@@ -1158,7 +1727,7 @@
                 </a:solidFill>
                 <a:latin typeface="Arial"/>
               </a:rPr>
-              <a:t>Predicción con Máquinas de soporte Vectorial</a:t>
+              <a:t>Predicción con Máquinas de soporte Vectorial y con Random Forest</a:t>
             </a:r>
             <a:endParaRPr b="0" lang="es-CO" sz="4400" spc="-1" strike="noStrike">
               <a:solidFill>
@@ -1171,7 +1740,7 @@
       </p:sp>
       <p:pic>
         <p:nvPicPr>
-          <p:cNvPr id="16" name="" descr=""/>
+          <p:cNvPr id="21" name="" descr=""/>
           <p:cNvPicPr/>
           <p:nvPr/>
         </p:nvPicPr>
@@ -1182,7 +1751,7 @@
         <p:spPr>
           <a:xfrm>
             <a:off x="2160000" y="1324440"/>
-            <a:ext cx="5611680" cy="4208760"/>
+            <a:ext cx="5611320" cy="4208400"/>
           </a:xfrm>
           <a:prstGeom prst="rect">
             <a:avLst/>
@@ -1224,7 +1793,7 @@
       </p:grpSpPr>
       <p:sp>
         <p:nvSpPr>
-          <p:cNvPr id="17" name="PlaceHolder 1"/>
+          <p:cNvPr id="22" name="PlaceHolder 1"/>
           <p:cNvSpPr>
             <a:spLocks noGrp="1"/>
           </p:cNvSpPr>
@@ -1235,7 +1804,7 @@
         <p:spPr>
           <a:xfrm>
             <a:off x="504000" y="226080"/>
-            <a:ext cx="9071640" cy="946440"/>
+            <a:ext cx="9071280" cy="946080"/>
           </a:xfrm>
           <a:prstGeom prst="rect">
             <a:avLst/>
@@ -1251,7 +1820,13 @@
           </a:bodyPr>
           <a:p>
             <a:pPr indent="0" algn="ctr">
-              <a:buNone/>
+              <a:lnSpc>
+                <a:spcPct val="100000"/>
+              </a:lnSpc>
+              <a:buNone/>
+              <a:tabLst>
+                <a:tab algn="l" pos="0"/>
+              </a:tabLst>
             </a:pPr>
             <a:r>
               <a:rPr b="0" lang="es-CO" sz="4400" spc="-1" strike="noStrike">
@@ -1273,7 +1848,7 @@
       </p:sp>
       <p:sp>
         <p:nvSpPr>
-          <p:cNvPr id="18" name="PlaceHolder 2"/>
+          <p:cNvPr id="23" name="PlaceHolder 2"/>
           <p:cNvSpPr>
             <a:spLocks noGrp="1"/>
           </p:cNvSpPr>
@@ -1284,7 +1859,7 @@
         <p:spPr>
           <a:xfrm>
             <a:off x="504000" y="1326600"/>
-            <a:ext cx="9071640" cy="3288240"/>
+            <a:ext cx="9071280" cy="3287880"/>
           </a:xfrm>
           <a:prstGeom prst="rect">
             <a:avLst/>
@@ -1300,6 +1875,9 @@
           </a:bodyPr>
           <a:p>
             <a:pPr marL="432000" indent="-324000">
+              <a:lnSpc>
+                <a:spcPct val="100000"/>
+              </a:lnSpc>
               <a:spcBef>
                 <a:spcPts val="1191"/>
               </a:spcBef>
@@ -1320,8 +1898,53 @@
                 </a:solidFill>
                 <a:latin typeface="Arial"/>
               </a:rPr>
-              <a:t>Silva, Esteban. 2024. Antioquia Mira su Cielo: Datos </a:t>
-            </a:r>
+              <a:t>Silva, Esteban. 2024. Antioquia Mira su Cielo: Datos meteorológicos. Accessed May 26, 2024. </a:t>
+            </a:r>
+            <a:r>
+              <a:rPr b="0" lang="es-CO" sz="2400" spc="-1" strike="noStrike" u="sng">
+                <a:solidFill>
+                  <a:srgbClr val="0000ee"/>
+                </a:solidFill>
+                <a:uFillTx/>
+                <a:latin typeface="Arial"/>
+                <a:hlinkClick r:id="rId1"/>
+              </a:rPr>
+              <a:t>http://54.146.188.73:8501/</a:t>
+            </a:r>
+            <a:r>
+              <a:rPr b="0" lang="es-CO" sz="1000" spc="-1" strike="noStrike">
+                <a:solidFill>
+                  <a:srgbClr val="000000"/>
+                </a:solidFill>
+                <a:latin typeface="Arial"/>
+              </a:rPr>
+              <a:t>.</a:t>
+            </a:r>
+            <a:endParaRPr b="0" lang="es-CO" sz="1000" spc="-1" strike="noStrike">
+              <a:solidFill>
+                <a:srgbClr val="000000"/>
+              </a:solidFill>
+              <a:latin typeface="Arial"/>
+            </a:endParaRPr>
+          </a:p>
+          <a:p>
+            <a:pPr marL="432000" indent="-324000">
+              <a:lnSpc>
+                <a:spcPct val="100000"/>
+              </a:lnSpc>
+              <a:spcBef>
+                <a:spcPts val="1191"/>
+              </a:spcBef>
+              <a:spcAft>
+                <a:spcPts val="992"/>
+              </a:spcAft>
+              <a:buClr>
+                <a:srgbClr val="000000"/>
+              </a:buClr>
+              <a:buSzPct val="45000"/>
+              <a:buFont typeface="Wingdings" charset="2"/>
+              <a:buChar char=""/>
+            </a:pPr>
             <a:r>
               <a:rPr b="0" lang="es-CO" sz="2400" spc="-1" strike="noStrike">
                 <a:solidFill>
@@ -1329,28 +1952,9 @@
                 </a:solidFill>
                 <a:latin typeface="Arial"/>
               </a:rPr>
-              <a:t>meteorológicos. Accessed May 26, 2024. </a:t>
-            </a:r>
-            <a:r>
-              <a:rPr b="0" lang="es-CO" sz="2400" spc="-1" strike="noStrike">
-                <a:solidFill>
-                  <a:srgbClr val="000000"/>
-                </a:solidFill>
-                <a:latin typeface="Arial"/>
-                <a:hlinkClick r:id="rId1"/>
-              </a:rPr>
-              <a:t>http://54.146.188.73:8501/</a:t>
-            </a:r>
-            <a:r>
-              <a:rPr b="0" lang="es-CO" sz="1000" spc="-1" strike="noStrike">
-                <a:solidFill>
-                  <a:srgbClr val="000000"/>
-                </a:solidFill>
-                <a:latin typeface="Arial"/>
-              </a:rPr>
-              <a:t>.</a:t>
-            </a:r>
-            <a:endParaRPr b="0" lang="es-CO" sz="1000" spc="-1" strike="noStrike">
+              <a:t>Géron, A. (2022). Hands-on machine learning with Scikit-Learn, Keras, and TensorFlow. " O'Reilly Media, Inc.".</a:t>
+            </a:r>
+            <a:endParaRPr b="0" lang="es-CO" sz="2400" spc="-1" strike="noStrike">
               <a:solidFill>
                 <a:srgbClr val="000000"/>
               </a:solidFill>
@@ -1476,4 +2080,110 @@
     </a:fmtScheme>
   </a:themeElements>
 </a:theme>
+</file>
+
+<file path=ppt/theme/theme2.xml><?xml version="1.0" encoding="utf-8"?>
+<a:theme xmlns:a="http://schemas.openxmlformats.org/drawingml/2006/main" xmlns:r="http://schemas.openxmlformats.org/officeDocument/2006/relationships" name="Office">
+  <a:themeElements>
+    <a:clrScheme name="LibreOffice">
+      <a:dk1>
+        <a:srgbClr val="000000"/>
+      </a:dk1>
+      <a:lt1>
+        <a:srgbClr val="ffffff"/>
+      </a:lt1>
+      <a:dk2>
+        <a:srgbClr val="000000"/>
+      </a:dk2>
+      <a:lt2>
+        <a:srgbClr val="ffffff"/>
+      </a:lt2>
+      <a:accent1>
+        <a:srgbClr val="18a303"/>
+      </a:accent1>
+      <a:accent2>
+        <a:srgbClr val="0369a3"/>
+      </a:accent2>
+      <a:accent3>
+        <a:srgbClr val="a33e03"/>
+      </a:accent3>
+      <a:accent4>
+        <a:srgbClr val="8e03a3"/>
+      </a:accent4>
+      <a:accent5>
+        <a:srgbClr val="c99c00"/>
+      </a:accent5>
+      <a:accent6>
+        <a:srgbClr val="c9211e"/>
+      </a:accent6>
+      <a:hlink>
+        <a:srgbClr val="0000ee"/>
+      </a:hlink>
+      <a:folHlink>
+        <a:srgbClr val="551a8b"/>
+      </a:folHlink>
+    </a:clrScheme>
+    <a:fontScheme name="Office">
+      <a:majorFont>
+        <a:latin typeface="Arial" pitchFamily="0" charset="1"/>
+        <a:ea typeface="DejaVu Sans" pitchFamily="0" charset="1"/>
+        <a:cs typeface="DejaVu Sans" pitchFamily="0" charset="1"/>
+      </a:majorFont>
+      <a:minorFont>
+        <a:latin typeface="Arial" pitchFamily="0" charset="1"/>
+        <a:ea typeface="DejaVu Sans" pitchFamily="0" charset="1"/>
+        <a:cs typeface="DejaVu Sans" pitchFamily="0" charset="1"/>
+      </a:minorFont>
+    </a:fontScheme>
+    <a:fmtScheme>
+      <a:fillStyleLst>
+        <a:solidFill>
+          <a:schemeClr val="phClr"/>
+        </a:solidFill>
+        <a:solidFill>
+          <a:schemeClr val="phClr"/>
+        </a:solidFill>
+        <a:solidFill>
+          <a:schemeClr val="phClr"/>
+        </a:solidFill>
+      </a:fillStyleLst>
+      <a:lnStyleLst>
+        <a:ln w="6350" cap="flat" cmpd="sng" algn="ctr">
+          <a:prstDash val="solid"/>
+          <a:miter/>
+        </a:ln>
+        <a:ln w="6350" cap="flat" cmpd="sng" algn="ctr">
+          <a:prstDash val="solid"/>
+          <a:miter/>
+        </a:ln>
+        <a:ln w="6350" cap="flat" cmpd="sng" algn="ctr">
+          <a:prstDash val="solid"/>
+          <a:miter/>
+        </a:ln>
+      </a:lnStyleLst>
+      <a:effectStyleLst>
+        <a:effectStyle>
+          <a:effectLst/>
+        </a:effectStyle>
+        <a:effectStyle>
+          <a:effectLst/>
+        </a:effectStyle>
+        <a:effectStyle>
+          <a:effectLst/>
+        </a:effectStyle>
+      </a:effectStyleLst>
+      <a:bgFillStyleLst>
+        <a:solidFill>
+          <a:schemeClr val="phClr"/>
+        </a:solidFill>
+        <a:solidFill>
+          <a:schemeClr val="phClr"/>
+        </a:solidFill>
+        <a:solidFill>
+          <a:schemeClr val="phClr"/>
+        </a:solidFill>
+      </a:bgFillStyleLst>
+    </a:fmtScheme>
+  </a:themeElements>
+</a:theme>
 </file>
</xml_diff>